<commit_message>
updating to new class name for sliders
</commit_message>
<xml_diff>
--- a/doc/ui_class_diagram.pptx
+++ b/doc/ui_class_diagram.pptx
@@ -289,7 +289,7 @@
           <a:p>
             <a:fld id="{4ADE7A81-68AD-7C4F-93EC-91A9EAC43185}" type="datetimeFigureOut">
               <a:rPr lang="en-US" smtClean="0"/>
-              <a:t>11/10/18</a:t>
+              <a:t>11/13/18</a:t>
             </a:fld>
             <a:endParaRPr lang="en-US"/>
           </a:p>
@@ -459,7 +459,7 @@
           <a:p>
             <a:fld id="{4ADE7A81-68AD-7C4F-93EC-91A9EAC43185}" type="datetimeFigureOut">
               <a:rPr lang="en-US" smtClean="0"/>
-              <a:t>11/10/18</a:t>
+              <a:t>11/13/18</a:t>
             </a:fld>
             <a:endParaRPr lang="en-US"/>
           </a:p>
@@ -639,7 +639,7 @@
           <a:p>
             <a:fld id="{4ADE7A81-68AD-7C4F-93EC-91A9EAC43185}" type="datetimeFigureOut">
               <a:rPr lang="en-US" smtClean="0"/>
-              <a:t>11/10/18</a:t>
+              <a:t>11/13/18</a:t>
             </a:fld>
             <a:endParaRPr lang="en-US"/>
           </a:p>
@@ -809,7 +809,7 @@
           <a:p>
             <a:fld id="{4ADE7A81-68AD-7C4F-93EC-91A9EAC43185}" type="datetimeFigureOut">
               <a:rPr lang="en-US" smtClean="0"/>
-              <a:t>11/10/18</a:t>
+              <a:t>11/13/18</a:t>
             </a:fld>
             <a:endParaRPr lang="en-US"/>
           </a:p>
@@ -1055,7 +1055,7 @@
           <a:p>
             <a:fld id="{4ADE7A81-68AD-7C4F-93EC-91A9EAC43185}" type="datetimeFigureOut">
               <a:rPr lang="en-US" smtClean="0"/>
-              <a:t>11/10/18</a:t>
+              <a:t>11/13/18</a:t>
             </a:fld>
             <a:endParaRPr lang="en-US"/>
           </a:p>
@@ -1343,7 +1343,7 @@
           <a:p>
             <a:fld id="{4ADE7A81-68AD-7C4F-93EC-91A9EAC43185}" type="datetimeFigureOut">
               <a:rPr lang="en-US" smtClean="0"/>
-              <a:t>11/10/18</a:t>
+              <a:t>11/13/18</a:t>
             </a:fld>
             <a:endParaRPr lang="en-US"/>
           </a:p>
@@ -1765,7 +1765,7 @@
           <a:p>
             <a:fld id="{4ADE7A81-68AD-7C4F-93EC-91A9EAC43185}" type="datetimeFigureOut">
               <a:rPr lang="en-US" smtClean="0"/>
-              <a:t>11/10/18</a:t>
+              <a:t>11/13/18</a:t>
             </a:fld>
             <a:endParaRPr lang="en-US"/>
           </a:p>
@@ -1883,7 +1883,7 @@
           <a:p>
             <a:fld id="{4ADE7A81-68AD-7C4F-93EC-91A9EAC43185}" type="datetimeFigureOut">
               <a:rPr lang="en-US" smtClean="0"/>
-              <a:t>11/10/18</a:t>
+              <a:t>11/13/18</a:t>
             </a:fld>
             <a:endParaRPr lang="en-US"/>
           </a:p>
@@ -1978,7 +1978,7 @@
           <a:p>
             <a:fld id="{4ADE7A81-68AD-7C4F-93EC-91A9EAC43185}" type="datetimeFigureOut">
               <a:rPr lang="en-US" smtClean="0"/>
-              <a:t>11/10/18</a:t>
+              <a:t>11/13/18</a:t>
             </a:fld>
             <a:endParaRPr lang="en-US"/>
           </a:p>
@@ -2255,7 +2255,7 @@
           <a:p>
             <a:fld id="{4ADE7A81-68AD-7C4F-93EC-91A9EAC43185}" type="datetimeFigureOut">
               <a:rPr lang="en-US" smtClean="0"/>
-              <a:t>11/10/18</a:t>
+              <a:t>11/13/18</a:t>
             </a:fld>
             <a:endParaRPr lang="en-US"/>
           </a:p>
@@ -2508,7 +2508,7 @@
           <a:p>
             <a:fld id="{4ADE7A81-68AD-7C4F-93EC-91A9EAC43185}" type="datetimeFigureOut">
               <a:rPr lang="en-US" smtClean="0"/>
-              <a:t>11/10/18</a:t>
+              <a:t>11/13/18</a:t>
             </a:fld>
             <a:endParaRPr lang="en-US"/>
           </a:p>
@@ -2721,7 +2721,7 @@
           <a:p>
             <a:fld id="{4ADE7A81-68AD-7C4F-93EC-91A9EAC43185}" type="datetimeFigureOut">
               <a:rPr lang="en-US" smtClean="0"/>
-              <a:t>11/10/18</a:t>
+              <a:t>11/13/18</a:t>
             </a:fld>
             <a:endParaRPr lang="en-US"/>
           </a:p>
@@ -3547,8 +3547,8 @@
         </p:nvSpPr>
         <p:spPr>
           <a:xfrm>
-            <a:off x="1034815" y="1326444"/>
-            <a:ext cx="2182519" cy="2690519"/>
+            <a:off x="197556" y="1326444"/>
+            <a:ext cx="3875851" cy="2690519"/>
           </a:xfrm>
           <a:prstGeom prst="rect">
             <a:avLst/>
@@ -3601,7 +3601,7 @@
         </p:nvSpPr>
         <p:spPr>
           <a:xfrm>
-            <a:off x="1298223" y="1796815"/>
+            <a:off x="366890" y="1862667"/>
             <a:ext cx="1665111" cy="159926"/>
           </a:xfrm>
           <a:prstGeom prst="rect">
@@ -3639,7 +3639,7 @@
         </p:nvSpPr>
         <p:spPr>
           <a:xfrm>
-            <a:off x="4647259" y="2097852"/>
+            <a:off x="6321778" y="2587038"/>
             <a:ext cx="2182519" cy="1241778"/>
           </a:xfrm>
           <a:prstGeom prst="rect">
@@ -3693,7 +3693,7 @@
         </p:nvSpPr>
         <p:spPr>
           <a:xfrm>
-            <a:off x="4647259" y="4112917"/>
+            <a:off x="5362223" y="346191"/>
             <a:ext cx="3273778" cy="1983083"/>
           </a:xfrm>
           <a:prstGeom prst="rect">
@@ -3747,7 +3747,7 @@
         </p:nvSpPr>
         <p:spPr>
           <a:xfrm>
-            <a:off x="4859866" y="4600222"/>
+            <a:off x="5574830" y="833496"/>
             <a:ext cx="2797764" cy="923330"/>
           </a:xfrm>
           <a:prstGeom prst="rect">
@@ -3826,14 +3826,15 @@
         <p:nvCxnSpPr>
           <p:cNvPr id="15" name="Straight Arrow Connector 14"/>
           <p:cNvCxnSpPr>
+            <a:stCxn id="4" idx="3"/>
             <a:endCxn id="11" idx="1"/>
           </p:cNvCxnSpPr>
           <p:nvPr/>
         </p:nvCxnSpPr>
         <p:spPr>
-          <a:xfrm>
-            <a:off x="2144889" y="2596444"/>
-            <a:ext cx="2502370" cy="2508015"/>
+          <a:xfrm flipV="1">
+            <a:off x="4073407" y="1337733"/>
+            <a:ext cx="1288816" cy="1333971"/>
           </a:xfrm>
           <a:prstGeom prst="straightConnector1">
             <a:avLst/>
@@ -3868,7 +3869,7 @@
         </p:nvSpPr>
         <p:spPr>
           <a:xfrm>
-            <a:off x="4758266" y="2487038"/>
+            <a:off x="6432785" y="2976224"/>
             <a:ext cx="2797764" cy="646331"/>
           </a:xfrm>
           <a:prstGeom prst="rect">
@@ -3920,6 +3921,198 @@
               <a:latin typeface="Courier"/>
               <a:cs typeface="Courier"/>
             </a:endParaRPr>
+          </a:p>
+        </p:txBody>
+      </p:sp>
+      <p:cxnSp>
+        <p:nvCxnSpPr>
+          <p:cNvPr id="12" name="Straight Arrow Connector 11"/>
+          <p:cNvCxnSpPr>
+            <a:endCxn id="10" idx="1"/>
+          </p:cNvCxnSpPr>
+          <p:nvPr/>
+        </p:nvCxnSpPr>
+        <p:spPr>
+          <a:xfrm>
+            <a:off x="5823185" y="1853260"/>
+            <a:ext cx="498593" cy="1354667"/>
+          </a:xfrm>
+          <a:prstGeom prst="straightConnector1">
+            <a:avLst/>
+          </a:prstGeom>
+          <a:ln>
+            <a:solidFill>
+              <a:schemeClr val="tx1"/>
+            </a:solidFill>
+            <a:tailEnd type="arrow"/>
+          </a:ln>
+        </p:spPr>
+        <p:style>
+          <a:lnRef idx="2">
+            <a:schemeClr val="accent1"/>
+          </a:lnRef>
+          <a:fillRef idx="0">
+            <a:schemeClr val="accent1"/>
+          </a:fillRef>
+          <a:effectRef idx="1">
+            <a:schemeClr val="accent1"/>
+          </a:effectRef>
+          <a:fontRef idx="minor">
+            <a:schemeClr val="tx1"/>
+          </a:fontRef>
+        </p:style>
+      </p:cxnSp>
+      <p:sp>
+        <p:nvSpPr>
+          <p:cNvPr id="17" name="TextBox 16"/>
+          <p:cNvSpPr txBox="1"/>
+          <p:nvPr/>
+        </p:nvSpPr>
+        <p:spPr>
+          <a:xfrm>
+            <a:off x="197556" y="3502869"/>
+            <a:ext cx="3875851" cy="276999"/>
+          </a:xfrm>
+          <a:prstGeom prst="rect">
+            <a:avLst/>
+          </a:prstGeom>
+          <a:noFill/>
+        </p:spPr>
+        <p:txBody>
+          <a:bodyPr wrap="square" rtlCol="0">
+            <a:spAutoFit/>
+          </a:bodyPr>
+          <a:lstStyle/>
+          <a:p>
+            <a:r>
+              <a:rPr lang="en-US" sz="1200" dirty="0" smtClean="0">
+                <a:latin typeface="Courier"/>
+                <a:cs typeface="Courier"/>
+              </a:rPr>
+              <a:t>emit </a:t>
+            </a:r>
+            <a:r>
+              <a:rPr lang="en-US" sz="1200" dirty="0" err="1" smtClean="0">
+                <a:latin typeface="Courier"/>
+                <a:cs typeface="Courier"/>
+              </a:rPr>
+              <a:t>artifactSelected</a:t>
+            </a:r>
+            <a:r>
+              <a:rPr lang="en-US" sz="1200" dirty="0" smtClean="0">
+                <a:latin typeface="Courier"/>
+                <a:cs typeface="Courier"/>
+              </a:rPr>
+              <a:t>(</a:t>
+            </a:r>
+            <a:r>
+              <a:rPr lang="en-US" sz="1200" dirty="0" err="1" smtClean="0">
+                <a:latin typeface="Courier"/>
+                <a:cs typeface="Courier"/>
+              </a:rPr>
+              <a:t>const</a:t>
+            </a:r>
+            <a:r>
+              <a:rPr lang="en-US" sz="1200" dirty="0" smtClean="0">
+                <a:latin typeface="Courier"/>
+                <a:cs typeface="Courier"/>
+              </a:rPr>
+              <a:t> </a:t>
+            </a:r>
+            <a:r>
+              <a:rPr lang="en-US" sz="1200" dirty="0" err="1" smtClean="0">
+                <a:latin typeface="Courier"/>
+                <a:cs typeface="Courier"/>
+              </a:rPr>
+              <a:t>QString</a:t>
+            </a:r>
+            <a:r>
+              <a:rPr lang="en-US" sz="1200" dirty="0" smtClean="0">
+                <a:latin typeface="Courier"/>
+                <a:cs typeface="Courier"/>
+              </a:rPr>
+              <a:t> &amp;)</a:t>
+            </a:r>
+            <a:endParaRPr lang="en-US" sz="1200" dirty="0">
+              <a:latin typeface="Courier"/>
+              <a:cs typeface="Courier"/>
+            </a:endParaRPr>
+          </a:p>
+        </p:txBody>
+      </p:sp>
+      <p:sp>
+        <p:nvSpPr>
+          <p:cNvPr id="20" name="Rectangle 19"/>
+          <p:cNvSpPr/>
+          <p:nvPr/>
+        </p:nvSpPr>
+        <p:spPr>
+          <a:xfrm>
+            <a:off x="366890" y="2095030"/>
+            <a:ext cx="1665111" cy="159926"/>
+          </a:xfrm>
+          <a:prstGeom prst="rect">
+            <a:avLst/>
+          </a:prstGeom>
+        </p:spPr>
+        <p:style>
+          <a:lnRef idx="1">
+            <a:schemeClr val="accent1"/>
+          </a:lnRef>
+          <a:fillRef idx="3">
+            <a:schemeClr val="accent1"/>
+          </a:fillRef>
+          <a:effectRef idx="2">
+            <a:schemeClr val="accent1"/>
+          </a:effectRef>
+          <a:fontRef idx="minor">
+            <a:schemeClr val="lt1"/>
+          </a:fontRef>
+        </p:style>
+        <p:txBody>
+          <a:bodyPr rtlCol="0" anchor="ctr"/>
+          <a:lstStyle/>
+          <a:p>
+            <a:pPr algn="ctr"/>
+            <a:endParaRPr lang="en-US"/>
+          </a:p>
+        </p:txBody>
+      </p:sp>
+      <p:sp>
+        <p:nvSpPr>
+          <p:cNvPr id="21" name="Rectangle 20"/>
+          <p:cNvSpPr/>
+          <p:nvPr/>
+        </p:nvSpPr>
+        <p:spPr>
+          <a:xfrm>
+            <a:off x="366890" y="2329274"/>
+            <a:ext cx="1665111" cy="159926"/>
+          </a:xfrm>
+          <a:prstGeom prst="rect">
+            <a:avLst/>
+          </a:prstGeom>
+        </p:spPr>
+        <p:style>
+          <a:lnRef idx="1">
+            <a:schemeClr val="accent1"/>
+          </a:lnRef>
+          <a:fillRef idx="3">
+            <a:schemeClr val="accent1"/>
+          </a:fillRef>
+          <a:effectRef idx="2">
+            <a:schemeClr val="accent1"/>
+          </a:effectRef>
+          <a:fontRef idx="minor">
+            <a:schemeClr val="lt1"/>
+          </a:fontRef>
+        </p:style>
+        <p:txBody>
+          <a:bodyPr rtlCol="0" anchor="ctr"/>
+          <a:lstStyle/>
+          <a:p>
+            <a:pPr algn="ctr"/>
+            <a:endParaRPr lang="en-US"/>
           </a:p>
         </p:txBody>
       </p:sp>

</xml_diff>

<commit_message>
adding new parameter and parameter set classes
</commit_message>
<xml_diff>
--- a/doc/ui_class_diagram.pptx
+++ b/doc/ui_class_diagram.pptx
@@ -105,6 +105,22 @@
       </a:defRPr>
     </a:lvl9pPr>
   </p:defaultTextStyle>
+  <p:extLst>
+    <p:ext uri="{EFAFB233-063F-42B5-8137-9DF3F51BA10A}">
+      <p15:sldGuideLst xmlns:p15="http://schemas.microsoft.com/office/powerpoint/2012/main">
+        <p15:guide id="1" orient="horz" pos="2160">
+          <p15:clr>
+            <a:srgbClr val="A4A3A4"/>
+          </p15:clr>
+        </p15:guide>
+        <p15:guide id="2" pos="2880">
+          <p15:clr>
+            <a:srgbClr val="A4A3A4"/>
+          </p15:clr>
+        </p15:guide>
+      </p15:sldGuideLst>
+    </p:ext>
+  </p:extLst>
 </p:presentation>
 </file>
 
@@ -146,10 +162,9 @@
           <a:lstStyle/>
           <a:p>
             <a:r>
-              <a:rPr lang="en-US" smtClean="0"/>
+              <a:rPr lang="en-US"/>
               <a:t>Click to edit Master title style</a:t>
             </a:r>
-            <a:endParaRPr lang="en-US"/>
           </a:p>
         </p:txBody>
       </p:sp>
@@ -265,10 +280,9 @@
           </a:lstStyle>
           <a:p>
             <a:r>
-              <a:rPr lang="en-US" smtClean="0"/>
+              <a:rPr lang="en-US"/>
               <a:t>Click to edit Master subtitle style</a:t>
             </a:r>
-            <a:endParaRPr lang="en-US"/>
           </a:p>
         </p:txBody>
       </p:sp>
@@ -383,10 +397,9 @@
           <a:lstStyle/>
           <a:p>
             <a:r>
-              <a:rPr lang="en-US" smtClean="0"/>
+              <a:rPr lang="en-US"/>
               <a:t>Click to edit Master title style</a:t>
             </a:r>
-            <a:endParaRPr lang="en-US"/>
           </a:p>
         </p:txBody>
       </p:sp>
@@ -407,38 +420,37 @@
           <a:p>
             <a:pPr lvl="0"/>
             <a:r>
-              <a:rPr lang="en-US" smtClean="0"/>
+              <a:rPr lang="en-US"/>
               <a:t>Click to edit Master text styles</a:t>
             </a:r>
           </a:p>
           <a:p>
             <a:pPr lvl="1"/>
             <a:r>
-              <a:rPr lang="en-US" smtClean="0"/>
+              <a:rPr lang="en-US"/>
               <a:t>Second level</a:t>
             </a:r>
           </a:p>
           <a:p>
             <a:pPr lvl="2"/>
             <a:r>
-              <a:rPr lang="en-US" smtClean="0"/>
+              <a:rPr lang="en-US"/>
               <a:t>Third level</a:t>
             </a:r>
           </a:p>
           <a:p>
             <a:pPr lvl="3"/>
             <a:r>
-              <a:rPr lang="en-US" smtClean="0"/>
+              <a:rPr lang="en-US"/>
               <a:t>Fourth level</a:t>
             </a:r>
           </a:p>
           <a:p>
             <a:pPr lvl="4"/>
             <a:r>
-              <a:rPr lang="en-US" smtClean="0"/>
+              <a:rPr lang="en-US"/>
               <a:t>Fifth level</a:t>
             </a:r>
-            <a:endParaRPr lang="en-US"/>
           </a:p>
         </p:txBody>
       </p:sp>
@@ -558,10 +570,9 @@
           <a:lstStyle/>
           <a:p>
             <a:r>
-              <a:rPr lang="en-US" smtClean="0"/>
+              <a:rPr lang="en-US"/>
               <a:t>Click to edit Master title style</a:t>
             </a:r>
-            <a:endParaRPr lang="en-US"/>
           </a:p>
         </p:txBody>
       </p:sp>
@@ -587,38 +598,37 @@
           <a:p>
             <a:pPr lvl="0"/>
             <a:r>
-              <a:rPr lang="en-US" smtClean="0"/>
+              <a:rPr lang="en-US"/>
               <a:t>Click to edit Master text styles</a:t>
             </a:r>
           </a:p>
           <a:p>
             <a:pPr lvl="1"/>
             <a:r>
-              <a:rPr lang="en-US" smtClean="0"/>
+              <a:rPr lang="en-US"/>
               <a:t>Second level</a:t>
             </a:r>
           </a:p>
           <a:p>
             <a:pPr lvl="2"/>
             <a:r>
-              <a:rPr lang="en-US" smtClean="0"/>
+              <a:rPr lang="en-US"/>
               <a:t>Third level</a:t>
             </a:r>
           </a:p>
           <a:p>
             <a:pPr lvl="3"/>
             <a:r>
-              <a:rPr lang="en-US" smtClean="0"/>
+              <a:rPr lang="en-US"/>
               <a:t>Fourth level</a:t>
             </a:r>
           </a:p>
           <a:p>
             <a:pPr lvl="4"/>
             <a:r>
-              <a:rPr lang="en-US" smtClean="0"/>
+              <a:rPr lang="en-US"/>
               <a:t>Fifth level</a:t>
             </a:r>
-            <a:endParaRPr lang="en-US"/>
           </a:p>
         </p:txBody>
       </p:sp>
@@ -733,10 +743,9 @@
           <a:lstStyle/>
           <a:p>
             <a:r>
-              <a:rPr lang="en-US" smtClean="0"/>
+              <a:rPr lang="en-US"/>
               <a:t>Click to edit Master title style</a:t>
             </a:r>
-            <a:endParaRPr lang="en-US"/>
           </a:p>
         </p:txBody>
       </p:sp>
@@ -757,38 +766,37 @@
           <a:p>
             <a:pPr lvl="0"/>
             <a:r>
-              <a:rPr lang="en-US" smtClean="0"/>
+              <a:rPr lang="en-US"/>
               <a:t>Click to edit Master text styles</a:t>
             </a:r>
           </a:p>
           <a:p>
             <a:pPr lvl="1"/>
             <a:r>
-              <a:rPr lang="en-US" smtClean="0"/>
+              <a:rPr lang="en-US"/>
               <a:t>Second level</a:t>
             </a:r>
           </a:p>
           <a:p>
             <a:pPr lvl="2"/>
             <a:r>
-              <a:rPr lang="en-US" smtClean="0"/>
+              <a:rPr lang="en-US"/>
               <a:t>Third level</a:t>
             </a:r>
           </a:p>
           <a:p>
             <a:pPr lvl="3"/>
             <a:r>
-              <a:rPr lang="en-US" smtClean="0"/>
+              <a:rPr lang="en-US"/>
               <a:t>Fourth level</a:t>
             </a:r>
           </a:p>
           <a:p>
             <a:pPr lvl="4"/>
             <a:r>
-              <a:rPr lang="en-US" smtClean="0"/>
+              <a:rPr lang="en-US"/>
               <a:t>Fifth level</a:t>
             </a:r>
-            <a:endParaRPr lang="en-US"/>
           </a:p>
         </p:txBody>
       </p:sp>
@@ -912,10 +920,9 @@
           </a:lstStyle>
           <a:p>
             <a:r>
-              <a:rPr lang="en-US" smtClean="0"/>
+              <a:rPr lang="en-US"/>
               <a:t>Click to edit Master title style</a:t>
             </a:r>
-            <a:endParaRPr lang="en-US"/>
           </a:p>
         </p:txBody>
       </p:sp>
@@ -1032,7 +1039,7 @@
           <a:p>
             <a:pPr lvl="0"/>
             <a:r>
-              <a:rPr lang="en-US" smtClean="0"/>
+              <a:rPr lang="en-US"/>
               <a:t>Click to edit Master text styles</a:t>
             </a:r>
           </a:p>
@@ -1149,10 +1156,9 @@
           <a:lstStyle/>
           <a:p>
             <a:r>
-              <a:rPr lang="en-US" smtClean="0"/>
+              <a:rPr lang="en-US"/>
               <a:t>Click to edit Master title style</a:t>
             </a:r>
-            <a:endParaRPr lang="en-US"/>
           </a:p>
         </p:txBody>
       </p:sp>
@@ -1206,38 +1212,37 @@
           <a:p>
             <a:pPr lvl="0"/>
             <a:r>
-              <a:rPr lang="en-US" smtClean="0"/>
+              <a:rPr lang="en-US"/>
               <a:t>Click to edit Master text styles</a:t>
             </a:r>
           </a:p>
           <a:p>
             <a:pPr lvl="1"/>
             <a:r>
-              <a:rPr lang="en-US" smtClean="0"/>
+              <a:rPr lang="en-US"/>
               <a:t>Second level</a:t>
             </a:r>
           </a:p>
           <a:p>
             <a:pPr lvl="2"/>
             <a:r>
-              <a:rPr lang="en-US" smtClean="0"/>
+              <a:rPr lang="en-US"/>
               <a:t>Third level</a:t>
             </a:r>
           </a:p>
           <a:p>
             <a:pPr lvl="3"/>
             <a:r>
-              <a:rPr lang="en-US" smtClean="0"/>
+              <a:rPr lang="en-US"/>
               <a:t>Fourth level</a:t>
             </a:r>
           </a:p>
           <a:p>
             <a:pPr lvl="4"/>
             <a:r>
-              <a:rPr lang="en-US" smtClean="0"/>
+              <a:rPr lang="en-US"/>
               <a:t>Fifth level</a:t>
             </a:r>
-            <a:endParaRPr lang="en-US"/>
           </a:p>
         </p:txBody>
       </p:sp>
@@ -1291,38 +1296,37 @@
           <a:p>
             <a:pPr lvl="0"/>
             <a:r>
-              <a:rPr lang="en-US" smtClean="0"/>
+              <a:rPr lang="en-US"/>
               <a:t>Click to edit Master text styles</a:t>
             </a:r>
           </a:p>
           <a:p>
             <a:pPr lvl="1"/>
             <a:r>
-              <a:rPr lang="en-US" smtClean="0"/>
+              <a:rPr lang="en-US"/>
               <a:t>Second level</a:t>
             </a:r>
           </a:p>
           <a:p>
             <a:pPr lvl="2"/>
             <a:r>
-              <a:rPr lang="en-US" smtClean="0"/>
+              <a:rPr lang="en-US"/>
               <a:t>Third level</a:t>
             </a:r>
           </a:p>
           <a:p>
             <a:pPr lvl="3"/>
             <a:r>
-              <a:rPr lang="en-US" smtClean="0"/>
+              <a:rPr lang="en-US"/>
               <a:t>Fourth level</a:t>
             </a:r>
           </a:p>
           <a:p>
             <a:pPr lvl="4"/>
             <a:r>
-              <a:rPr lang="en-US" smtClean="0"/>
+              <a:rPr lang="en-US"/>
               <a:t>Fifth level</a:t>
             </a:r>
-            <a:endParaRPr lang="en-US"/>
           </a:p>
         </p:txBody>
       </p:sp>
@@ -1441,10 +1445,9 @@
           </a:lstStyle>
           <a:p>
             <a:r>
-              <a:rPr lang="en-US" smtClean="0"/>
+              <a:rPr lang="en-US"/>
               <a:t>Click to edit Master title style</a:t>
             </a:r>
-            <a:endParaRPr lang="en-US"/>
           </a:p>
         </p:txBody>
       </p:sp>
@@ -1507,7 +1510,7 @@
           <a:p>
             <a:pPr lvl="0"/>
             <a:r>
-              <a:rPr lang="en-US" smtClean="0"/>
+              <a:rPr lang="en-US"/>
               <a:t>Click to edit Master text styles</a:t>
             </a:r>
           </a:p>
@@ -1563,38 +1566,37 @@
           <a:p>
             <a:pPr lvl="0"/>
             <a:r>
-              <a:rPr lang="en-US" smtClean="0"/>
+              <a:rPr lang="en-US"/>
               <a:t>Click to edit Master text styles</a:t>
             </a:r>
           </a:p>
           <a:p>
             <a:pPr lvl="1"/>
             <a:r>
-              <a:rPr lang="en-US" smtClean="0"/>
+              <a:rPr lang="en-US"/>
               <a:t>Second level</a:t>
             </a:r>
           </a:p>
           <a:p>
             <a:pPr lvl="2"/>
             <a:r>
-              <a:rPr lang="en-US" smtClean="0"/>
+              <a:rPr lang="en-US"/>
               <a:t>Third level</a:t>
             </a:r>
           </a:p>
           <a:p>
             <a:pPr lvl="3"/>
             <a:r>
-              <a:rPr lang="en-US" smtClean="0"/>
+              <a:rPr lang="en-US"/>
               <a:t>Fourth level</a:t>
             </a:r>
           </a:p>
           <a:p>
             <a:pPr lvl="4"/>
             <a:r>
-              <a:rPr lang="en-US" smtClean="0"/>
+              <a:rPr lang="en-US"/>
               <a:t>Fifth level</a:t>
             </a:r>
-            <a:endParaRPr lang="en-US"/>
           </a:p>
         </p:txBody>
       </p:sp>
@@ -1657,7 +1659,7 @@
           <a:p>
             <a:pPr lvl="0"/>
             <a:r>
-              <a:rPr lang="en-US" smtClean="0"/>
+              <a:rPr lang="en-US"/>
               <a:t>Click to edit Master text styles</a:t>
             </a:r>
           </a:p>
@@ -1713,38 +1715,37 @@
           <a:p>
             <a:pPr lvl="0"/>
             <a:r>
-              <a:rPr lang="en-US" smtClean="0"/>
+              <a:rPr lang="en-US"/>
               <a:t>Click to edit Master text styles</a:t>
             </a:r>
           </a:p>
           <a:p>
             <a:pPr lvl="1"/>
             <a:r>
-              <a:rPr lang="en-US" smtClean="0"/>
+              <a:rPr lang="en-US"/>
               <a:t>Second level</a:t>
             </a:r>
           </a:p>
           <a:p>
             <a:pPr lvl="2"/>
             <a:r>
-              <a:rPr lang="en-US" smtClean="0"/>
+              <a:rPr lang="en-US"/>
               <a:t>Third level</a:t>
             </a:r>
           </a:p>
           <a:p>
             <a:pPr lvl="3"/>
             <a:r>
-              <a:rPr lang="en-US" smtClean="0"/>
+              <a:rPr lang="en-US"/>
               <a:t>Fourth level</a:t>
             </a:r>
           </a:p>
           <a:p>
             <a:pPr lvl="4"/>
             <a:r>
-              <a:rPr lang="en-US" smtClean="0"/>
+              <a:rPr lang="en-US"/>
               <a:t>Fifth level</a:t>
             </a:r>
-            <a:endParaRPr lang="en-US"/>
           </a:p>
         </p:txBody>
       </p:sp>
@@ -1859,10 +1860,9 @@
           <a:lstStyle/>
           <a:p>
             <a:r>
-              <a:rPr lang="en-US" smtClean="0"/>
+              <a:rPr lang="en-US"/>
               <a:t>Click to edit Master title style</a:t>
             </a:r>
-            <a:endParaRPr lang="en-US"/>
           </a:p>
         </p:txBody>
       </p:sp>
@@ -2081,10 +2081,9 @@
           </a:lstStyle>
           <a:p>
             <a:r>
-              <a:rPr lang="en-US" smtClean="0"/>
+              <a:rPr lang="en-US"/>
               <a:t>Click to edit Master title style</a:t>
             </a:r>
-            <a:endParaRPr lang="en-US"/>
           </a:p>
         </p:txBody>
       </p:sp>
@@ -2138,38 +2137,37 @@
           <a:p>
             <a:pPr lvl="0"/>
             <a:r>
-              <a:rPr lang="en-US" smtClean="0"/>
+              <a:rPr lang="en-US"/>
               <a:t>Click to edit Master text styles</a:t>
             </a:r>
           </a:p>
           <a:p>
             <a:pPr lvl="1"/>
             <a:r>
-              <a:rPr lang="en-US" smtClean="0"/>
+              <a:rPr lang="en-US"/>
               <a:t>Second level</a:t>
             </a:r>
           </a:p>
           <a:p>
             <a:pPr lvl="2"/>
             <a:r>
-              <a:rPr lang="en-US" smtClean="0"/>
+              <a:rPr lang="en-US"/>
               <a:t>Third level</a:t>
             </a:r>
           </a:p>
           <a:p>
             <a:pPr lvl="3"/>
             <a:r>
-              <a:rPr lang="en-US" smtClean="0"/>
+              <a:rPr lang="en-US"/>
               <a:t>Fourth level</a:t>
             </a:r>
           </a:p>
           <a:p>
             <a:pPr lvl="4"/>
             <a:r>
-              <a:rPr lang="en-US" smtClean="0"/>
+              <a:rPr lang="en-US"/>
               <a:t>Fifth level</a:t>
             </a:r>
-            <a:endParaRPr lang="en-US"/>
           </a:p>
         </p:txBody>
       </p:sp>
@@ -2232,7 +2230,7 @@
           <a:p>
             <a:pPr lvl="0"/>
             <a:r>
-              <a:rPr lang="en-US" smtClean="0"/>
+              <a:rPr lang="en-US"/>
               <a:t>Click to edit Master text styles</a:t>
             </a:r>
           </a:p>
@@ -2358,10 +2356,9 @@
           </a:lstStyle>
           <a:p>
             <a:r>
-              <a:rPr lang="en-US" smtClean="0"/>
+              <a:rPr lang="en-US"/>
               <a:t>Click to edit Master title style</a:t>
             </a:r>
-            <a:endParaRPr lang="en-US"/>
           </a:p>
         </p:txBody>
       </p:sp>
@@ -2485,7 +2482,7 @@
           <a:p>
             <a:pPr lvl="0"/>
             <a:r>
-              <a:rPr lang="en-US" smtClean="0"/>
+              <a:rPr lang="en-US"/>
               <a:t>Click to edit Master text styles</a:t>
             </a:r>
           </a:p>
@@ -2617,10 +2614,9 @@
           <a:lstStyle/>
           <a:p>
             <a:r>
-              <a:rPr lang="en-US" smtClean="0"/>
+              <a:rPr lang="en-US"/>
               <a:t>Click to edit Master title style</a:t>
             </a:r>
-            <a:endParaRPr lang="en-US"/>
           </a:p>
         </p:txBody>
       </p:sp>
@@ -2651,38 +2647,37 @@
           <a:p>
             <a:pPr lvl="0"/>
             <a:r>
-              <a:rPr lang="en-US" smtClean="0"/>
+              <a:rPr lang="en-US"/>
               <a:t>Click to edit Master text styles</a:t>
             </a:r>
           </a:p>
           <a:p>
             <a:pPr lvl="1"/>
             <a:r>
-              <a:rPr lang="en-US" smtClean="0"/>
+              <a:rPr lang="en-US"/>
               <a:t>Second level</a:t>
             </a:r>
           </a:p>
           <a:p>
             <a:pPr lvl="2"/>
             <a:r>
-              <a:rPr lang="en-US" smtClean="0"/>
+              <a:rPr lang="en-US"/>
               <a:t>Third level</a:t>
             </a:r>
           </a:p>
           <a:p>
             <a:pPr lvl="3"/>
             <a:r>
-              <a:rPr lang="en-US" smtClean="0"/>
+              <a:rPr lang="en-US"/>
               <a:t>Fourth level</a:t>
             </a:r>
           </a:p>
           <a:p>
             <a:pPr lvl="4"/>
             <a:r>
-              <a:rPr lang="en-US" smtClean="0"/>
+              <a:rPr lang="en-US"/>
               <a:t>Fifth level</a:t>
             </a:r>
-            <a:endParaRPr lang="en-US"/>
           </a:p>
         </p:txBody>
       </p:sp>
@@ -3136,7 +3131,7 @@
           <a:p>
             <a:pPr algn="ctr"/>
             <a:r>
-              <a:rPr lang="en-US" dirty="0" err="1" smtClean="0">
+              <a:rPr lang="en-US" dirty="0" err="1">
                 <a:solidFill>
                   <a:schemeClr val="tx1"/>
                 </a:solidFill>
@@ -3195,7 +3190,7 @@
           <a:p>
             <a:pPr algn="ctr"/>
             <a:r>
-              <a:rPr lang="en-US" dirty="0" err="1" smtClean="0">
+              <a:rPr lang="en-US" dirty="0" err="1">
                 <a:solidFill>
                   <a:schemeClr val="tx1"/>
                 </a:solidFill>
@@ -3254,7 +3249,7 @@
           <a:p>
             <a:pPr algn="ctr"/>
             <a:r>
-              <a:rPr lang="en-US" dirty="0" smtClean="0">
+              <a:rPr lang="en-US" dirty="0">
                 <a:solidFill>
                   <a:schemeClr val="tx1"/>
                 </a:solidFill>
@@ -3263,13 +3258,6 @@
               </a:rPr>
               <a:t>splitter</a:t>
             </a:r>
-            <a:endParaRPr lang="en-US" dirty="0">
-              <a:solidFill>
-                <a:schemeClr val="tx1"/>
-              </a:solidFill>
-              <a:latin typeface="Courier"/>
-              <a:cs typeface="Courier"/>
-            </a:endParaRPr>
           </a:p>
         </p:txBody>
       </p:sp>
@@ -3313,7 +3301,7 @@
           <a:p>
             <a:pPr algn="ctr"/>
             <a:r>
-              <a:rPr lang="en-US" dirty="0" err="1" smtClean="0">
+              <a:rPr lang="en-US" dirty="0" err="1">
                 <a:solidFill>
                   <a:schemeClr val="tx1"/>
                 </a:solidFill>
@@ -3372,7 +3360,7 @@
           <a:p>
             <a:pPr algn="ctr"/>
             <a:r>
-              <a:rPr lang="en-US" dirty="0" err="1" smtClean="0">
+              <a:rPr lang="en-US" dirty="0" err="1">
                 <a:solidFill>
                   <a:schemeClr val="tx1"/>
                 </a:solidFill>
@@ -3431,7 +3419,7 @@
           <a:p>
             <a:pPr algn="ctr"/>
             <a:r>
-              <a:rPr lang="en-US" dirty="0" err="1" smtClean="0">
+              <a:rPr lang="en-US" dirty="0" err="1">
                 <a:solidFill>
                   <a:schemeClr val="tx1"/>
                 </a:solidFill>
@@ -3490,7 +3478,7 @@
           <a:p>
             <a:pPr algn="ctr"/>
             <a:r>
-              <a:rPr lang="en-US" smtClean="0">
+              <a:rPr lang="en-US">
                 <a:solidFill>
                   <a:schemeClr val="tx1"/>
                 </a:solidFill>
@@ -3541,98 +3529,6 @@
       </p:grpSpPr>
       <p:sp>
         <p:nvSpPr>
-          <p:cNvPr id="4" name="Rectangle 3"/>
-          <p:cNvSpPr/>
-          <p:nvPr/>
-        </p:nvSpPr>
-        <p:spPr>
-          <a:xfrm>
-            <a:off x="197556" y="1326444"/>
-            <a:ext cx="3875851" cy="2690519"/>
-          </a:xfrm>
-          <a:prstGeom prst="rect">
-            <a:avLst/>
-          </a:prstGeom>
-        </p:spPr>
-        <p:style>
-          <a:lnRef idx="1">
-            <a:schemeClr val="accent1"/>
-          </a:lnRef>
-          <a:fillRef idx="3">
-            <a:schemeClr val="accent1"/>
-          </a:fillRef>
-          <a:effectRef idx="2">
-            <a:schemeClr val="accent1"/>
-          </a:effectRef>
-          <a:fontRef idx="minor">
-            <a:schemeClr val="lt1"/>
-          </a:fontRef>
-        </p:style>
-        <p:txBody>
-          <a:bodyPr rtlCol="0" anchor="t" anchorCtr="0"/>
-          <a:lstStyle/>
-          <a:p>
-            <a:pPr algn="ctr"/>
-            <a:r>
-              <a:rPr lang="en-US" dirty="0" err="1" smtClean="0">
-                <a:solidFill>
-                  <a:schemeClr val="tx1"/>
-                </a:solidFill>
-                <a:latin typeface="Courier"/>
-                <a:cs typeface="Courier"/>
-              </a:rPr>
-              <a:t>CinDBSliders</a:t>
-            </a:r>
-            <a:endParaRPr lang="en-US" dirty="0">
-              <a:solidFill>
-                <a:schemeClr val="tx1"/>
-              </a:solidFill>
-              <a:latin typeface="Courier"/>
-              <a:cs typeface="Courier"/>
-            </a:endParaRPr>
-          </a:p>
-        </p:txBody>
-      </p:sp>
-      <p:sp>
-        <p:nvSpPr>
-          <p:cNvPr id="5" name="Rectangle 4"/>
-          <p:cNvSpPr/>
-          <p:nvPr/>
-        </p:nvSpPr>
-        <p:spPr>
-          <a:xfrm>
-            <a:off x="366890" y="1862667"/>
-            <a:ext cx="1665111" cy="159926"/>
-          </a:xfrm>
-          <a:prstGeom prst="rect">
-            <a:avLst/>
-          </a:prstGeom>
-        </p:spPr>
-        <p:style>
-          <a:lnRef idx="1">
-            <a:schemeClr val="accent1"/>
-          </a:lnRef>
-          <a:fillRef idx="3">
-            <a:schemeClr val="accent1"/>
-          </a:fillRef>
-          <a:effectRef idx="2">
-            <a:schemeClr val="accent1"/>
-          </a:effectRef>
-          <a:fontRef idx="minor">
-            <a:schemeClr val="lt1"/>
-          </a:fontRef>
-        </p:style>
-        <p:txBody>
-          <a:bodyPr rtlCol="0" anchor="ctr"/>
-          <a:lstStyle/>
-          <a:p>
-            <a:pPr algn="ctr"/>
-            <a:endParaRPr lang="en-US"/>
-          </a:p>
-        </p:txBody>
-      </p:sp>
-      <p:sp>
-        <p:nvSpPr>
           <p:cNvPr id="10" name="Rectangle 9"/>
           <p:cNvSpPr/>
           <p:nvPr/>
@@ -3666,7 +3562,7 @@
           <a:p>
             <a:pPr algn="ctr"/>
             <a:r>
-              <a:rPr lang="en-US" dirty="0" err="1" smtClean="0">
+              <a:rPr lang="en-US" dirty="0" err="1">
                 <a:solidFill>
                   <a:schemeClr val="tx1"/>
                 </a:solidFill>
@@ -3720,7 +3616,7 @@
           <a:p>
             <a:pPr algn="ctr"/>
             <a:r>
-              <a:rPr lang="en-US" dirty="0" err="1" smtClean="0">
+              <a:rPr lang="en-US" dirty="0" err="1">
                 <a:solidFill>
                   <a:schemeClr val="tx1"/>
                 </a:solidFill>
@@ -3762,54 +3658,54 @@
           <a:lstStyle/>
           <a:p>
             <a:r>
-              <a:rPr lang="en-US" dirty="0" smtClean="0">
+              <a:rPr lang="en-US" dirty="0">
                 <a:latin typeface="Courier"/>
                 <a:cs typeface="Courier"/>
               </a:rPr>
               <a:t>- </a:t>
             </a:r>
             <a:r>
-              <a:rPr lang="en-US" dirty="0" err="1" smtClean="0">
+              <a:rPr lang="en-US" dirty="0" err="1">
                 <a:latin typeface="Courier"/>
                 <a:cs typeface="Courier"/>
               </a:rPr>
               <a:t>mSqlDatabase</a:t>
             </a:r>
-            <a:endParaRPr lang="en-US" dirty="0" smtClean="0">
+            <a:endParaRPr lang="en-US" dirty="0">
               <a:latin typeface="Courier"/>
               <a:cs typeface="Courier"/>
             </a:endParaRPr>
           </a:p>
           <a:p>
             <a:r>
-              <a:rPr lang="en-US" dirty="0" smtClean="0">
+              <a:rPr lang="en-US" dirty="0">
                 <a:latin typeface="Courier"/>
                 <a:cs typeface="Courier"/>
               </a:rPr>
               <a:t>- </a:t>
             </a:r>
             <a:r>
-              <a:rPr lang="en-US" dirty="0" err="1" smtClean="0">
+              <a:rPr lang="en-US" dirty="0" err="1">
                 <a:latin typeface="Courier"/>
                 <a:cs typeface="Courier"/>
               </a:rPr>
               <a:t>mTableName</a:t>
             </a:r>
-            <a:endParaRPr lang="en-US" dirty="0" smtClean="0">
+            <a:endParaRPr lang="en-US" dirty="0">
               <a:latin typeface="Courier"/>
               <a:cs typeface="Courier"/>
             </a:endParaRPr>
           </a:p>
           <a:p>
             <a:r>
-              <a:rPr lang="en-US" dirty="0" smtClean="0">
+              <a:rPr lang="en-US" dirty="0">
                 <a:latin typeface="Courier"/>
                 <a:cs typeface="Courier"/>
               </a:rPr>
               <a:t>- </a:t>
             </a:r>
             <a:r>
-              <a:rPr lang="en-US" dirty="0" err="1" smtClean="0">
+              <a:rPr lang="en-US" dirty="0" err="1">
                 <a:latin typeface="Courier"/>
                 <a:cs typeface="Courier"/>
               </a:rPr>
@@ -3833,8 +3729,8 @@
         </p:nvCxnSpPr>
         <p:spPr>
           <a:xfrm flipV="1">
-            <a:off x="4073407" y="1337733"/>
-            <a:ext cx="1288816" cy="1333971"/>
+            <a:off x="4328349" y="1337733"/>
+            <a:ext cx="1033874" cy="616397"/>
           </a:xfrm>
           <a:prstGeom prst="straightConnector1">
             <a:avLst/>
@@ -3884,34 +3780,34 @@
           <a:lstStyle/>
           <a:p>
             <a:r>
-              <a:rPr lang="en-US" dirty="0" smtClean="0">
+              <a:rPr lang="en-US" dirty="0">
                 <a:latin typeface="Courier"/>
                 <a:cs typeface="Courier"/>
               </a:rPr>
               <a:t>- </a:t>
             </a:r>
             <a:r>
-              <a:rPr lang="en-US" dirty="0" err="1" smtClean="0">
+              <a:rPr lang="en-US" dirty="0" err="1">
                 <a:latin typeface="Courier"/>
                 <a:cs typeface="Courier"/>
               </a:rPr>
               <a:t>mDBDir</a:t>
             </a:r>
-            <a:endParaRPr lang="en-US" dirty="0" smtClean="0">
+            <a:endParaRPr lang="en-US" dirty="0">
               <a:latin typeface="Courier"/>
               <a:cs typeface="Courier"/>
             </a:endParaRPr>
           </a:p>
           <a:p>
             <a:r>
-              <a:rPr lang="en-US" dirty="0" smtClean="0">
+              <a:rPr lang="en-US" dirty="0">
                 <a:latin typeface="Courier"/>
                 <a:cs typeface="Courier"/>
               </a:rPr>
               <a:t>- </a:t>
             </a:r>
             <a:r>
-              <a:rPr lang="en-US" dirty="0" err="1" smtClean="0">
+              <a:rPr lang="en-US" dirty="0" err="1">
                 <a:latin typeface="Courier"/>
                 <a:cs typeface="Courier"/>
               </a:rPr>
@@ -3962,160 +3858,269 @@
           </a:fontRef>
         </p:style>
       </p:cxnSp>
-      <p:sp>
-        <p:nvSpPr>
-          <p:cNvPr id="17" name="TextBox 16"/>
-          <p:cNvSpPr txBox="1"/>
+      <p:grpSp>
+        <p:nvGrpSpPr>
+          <p:cNvPr id="3" name="Group 2">
+            <a:extLst>
+              <a:ext uri="{FF2B5EF4-FFF2-40B4-BE49-F238E27FC236}">
+                <a16:creationId xmlns:a16="http://schemas.microsoft.com/office/drawing/2014/main" id="{4710F3E0-3B2F-E144-B60E-F9616EF315BB}"/>
+              </a:ext>
+            </a:extLst>
+          </p:cNvPr>
+          <p:cNvGrpSpPr/>
           <p:nvPr/>
-        </p:nvSpPr>
-        <p:spPr>
+        </p:nvGrpSpPr>
+        <p:grpSpPr>
           <a:xfrm>
-            <a:off x="197556" y="3502869"/>
-            <a:ext cx="3875851" cy="276999"/>
+            <a:off x="452498" y="608870"/>
+            <a:ext cx="3875851" cy="2690519"/>
+            <a:chOff x="197556" y="1326444"/>
+            <a:chExt cx="3875851" cy="2690519"/>
           </a:xfrm>
-          <a:prstGeom prst="rect">
-            <a:avLst/>
-          </a:prstGeom>
-          <a:noFill/>
-        </p:spPr>
-        <p:txBody>
-          <a:bodyPr wrap="square" rtlCol="0">
-            <a:spAutoFit/>
-          </a:bodyPr>
-          <a:lstStyle/>
-          <a:p>
-            <a:r>
-              <a:rPr lang="en-US" sz="1200" dirty="0" smtClean="0">
+        </p:grpSpPr>
+        <p:sp>
+          <p:nvSpPr>
+            <p:cNvPr id="4" name="Rectangle 3"/>
+            <p:cNvSpPr/>
+            <p:nvPr/>
+          </p:nvSpPr>
+          <p:spPr>
+            <a:xfrm>
+              <a:off x="197556" y="1326444"/>
+              <a:ext cx="3875851" cy="2690519"/>
+            </a:xfrm>
+            <a:prstGeom prst="rect">
+              <a:avLst/>
+            </a:prstGeom>
+          </p:spPr>
+          <p:style>
+            <a:lnRef idx="1">
+              <a:schemeClr val="accent1"/>
+            </a:lnRef>
+            <a:fillRef idx="3">
+              <a:schemeClr val="accent1"/>
+            </a:fillRef>
+            <a:effectRef idx="2">
+              <a:schemeClr val="accent1"/>
+            </a:effectRef>
+            <a:fontRef idx="minor">
+              <a:schemeClr val="lt1"/>
+            </a:fontRef>
+          </p:style>
+          <p:txBody>
+            <a:bodyPr rtlCol="0" anchor="t" anchorCtr="0"/>
+            <a:lstStyle/>
+            <a:p>
+              <a:pPr algn="ctr"/>
+              <a:r>
+                <a:rPr lang="en-US" dirty="0" err="1">
+                  <a:solidFill>
+                    <a:schemeClr val="tx1"/>
+                  </a:solidFill>
+                  <a:latin typeface="Courier"/>
+                  <a:cs typeface="Courier"/>
+                </a:rPr>
+                <a:t>CinDBSliders</a:t>
+              </a:r>
+              <a:endParaRPr lang="en-US" dirty="0">
+                <a:solidFill>
+                  <a:schemeClr val="tx1"/>
+                </a:solidFill>
                 <a:latin typeface="Courier"/>
                 <a:cs typeface="Courier"/>
-              </a:rPr>
-              <a:t>emit </a:t>
-            </a:r>
-            <a:r>
-              <a:rPr lang="en-US" sz="1200" dirty="0" err="1" smtClean="0">
-                <a:latin typeface="Courier"/>
-                <a:cs typeface="Courier"/>
-              </a:rPr>
-              <a:t>artifactSelected</a:t>
-            </a:r>
-            <a:r>
-              <a:rPr lang="en-US" sz="1200" dirty="0" smtClean="0">
-                <a:latin typeface="Courier"/>
-                <a:cs typeface="Courier"/>
-              </a:rPr>
-              <a:t>(</a:t>
-            </a:r>
-            <a:r>
-              <a:rPr lang="en-US" sz="1200" dirty="0" err="1" smtClean="0">
-                <a:latin typeface="Courier"/>
-                <a:cs typeface="Courier"/>
-              </a:rPr>
-              <a:t>const</a:t>
-            </a:r>
-            <a:r>
-              <a:rPr lang="en-US" sz="1200" dirty="0" smtClean="0">
-                <a:latin typeface="Courier"/>
-                <a:cs typeface="Courier"/>
-              </a:rPr>
-              <a:t> </a:t>
-            </a:r>
-            <a:r>
-              <a:rPr lang="en-US" sz="1200" dirty="0" err="1" smtClean="0">
-                <a:latin typeface="Courier"/>
-                <a:cs typeface="Courier"/>
-              </a:rPr>
-              <a:t>QString</a:t>
-            </a:r>
-            <a:r>
-              <a:rPr lang="en-US" sz="1200" dirty="0" smtClean="0">
-                <a:latin typeface="Courier"/>
-                <a:cs typeface="Courier"/>
-              </a:rPr>
-              <a:t> &amp;)</a:t>
-            </a:r>
-            <a:endParaRPr lang="en-US" sz="1200" dirty="0">
-              <a:latin typeface="Courier"/>
-              <a:cs typeface="Courier"/>
-            </a:endParaRPr>
-          </a:p>
-        </p:txBody>
-      </p:sp>
-      <p:sp>
-        <p:nvSpPr>
-          <p:cNvPr id="20" name="Rectangle 19"/>
-          <p:cNvSpPr/>
-          <p:nvPr/>
-        </p:nvSpPr>
-        <p:spPr>
-          <a:xfrm>
-            <a:off x="366890" y="2095030"/>
-            <a:ext cx="1665111" cy="159926"/>
-          </a:xfrm>
-          <a:prstGeom prst="rect">
-            <a:avLst/>
-          </a:prstGeom>
-        </p:spPr>
-        <p:style>
-          <a:lnRef idx="1">
-            <a:schemeClr val="accent1"/>
-          </a:lnRef>
-          <a:fillRef idx="3">
-            <a:schemeClr val="accent1"/>
-          </a:fillRef>
-          <a:effectRef idx="2">
-            <a:schemeClr val="accent1"/>
-          </a:effectRef>
-          <a:fontRef idx="minor">
-            <a:schemeClr val="lt1"/>
-          </a:fontRef>
-        </p:style>
-        <p:txBody>
-          <a:bodyPr rtlCol="0" anchor="ctr"/>
-          <a:lstStyle/>
-          <a:p>
-            <a:pPr algn="ctr"/>
-            <a:endParaRPr lang="en-US"/>
-          </a:p>
-        </p:txBody>
-      </p:sp>
-      <p:sp>
-        <p:nvSpPr>
-          <p:cNvPr id="21" name="Rectangle 20"/>
-          <p:cNvSpPr/>
-          <p:nvPr/>
-        </p:nvSpPr>
-        <p:spPr>
-          <a:xfrm>
-            <a:off x="366890" y="2329274"/>
-            <a:ext cx="1665111" cy="159926"/>
-          </a:xfrm>
-          <a:prstGeom prst="rect">
-            <a:avLst/>
-          </a:prstGeom>
-        </p:spPr>
-        <p:style>
-          <a:lnRef idx="1">
-            <a:schemeClr val="accent1"/>
-          </a:lnRef>
-          <a:fillRef idx="3">
-            <a:schemeClr val="accent1"/>
-          </a:fillRef>
-          <a:effectRef idx="2">
-            <a:schemeClr val="accent1"/>
-          </a:effectRef>
-          <a:fontRef idx="minor">
-            <a:schemeClr val="lt1"/>
-          </a:fontRef>
-        </p:style>
-        <p:txBody>
-          <a:bodyPr rtlCol="0" anchor="ctr"/>
-          <a:lstStyle/>
-          <a:p>
-            <a:pPr algn="ctr"/>
-            <a:endParaRPr lang="en-US"/>
-          </a:p>
-        </p:txBody>
-      </p:sp>
+              </a:endParaRPr>
+            </a:p>
+          </p:txBody>
+        </p:sp>
+        <p:sp>
+          <p:nvSpPr>
+            <p:cNvPr id="5" name="Rectangle 4"/>
+            <p:cNvSpPr/>
+            <p:nvPr/>
+          </p:nvSpPr>
+          <p:spPr>
+            <a:xfrm>
+              <a:off x="366890" y="1862667"/>
+              <a:ext cx="1665111" cy="159926"/>
+            </a:xfrm>
+            <a:prstGeom prst="rect">
+              <a:avLst/>
+            </a:prstGeom>
+          </p:spPr>
+          <p:style>
+            <a:lnRef idx="1">
+              <a:schemeClr val="accent1"/>
+            </a:lnRef>
+            <a:fillRef idx="3">
+              <a:schemeClr val="accent1"/>
+            </a:fillRef>
+            <a:effectRef idx="2">
+              <a:schemeClr val="accent1"/>
+            </a:effectRef>
+            <a:fontRef idx="minor">
+              <a:schemeClr val="lt1"/>
+            </a:fontRef>
+          </p:style>
+          <p:txBody>
+            <a:bodyPr rtlCol="0" anchor="ctr"/>
+            <a:lstStyle/>
+            <a:p>
+              <a:pPr algn="ctr"/>
+              <a:endParaRPr lang="en-US"/>
+            </a:p>
+          </p:txBody>
+        </p:sp>
+        <p:sp>
+          <p:nvSpPr>
+            <p:cNvPr id="17" name="TextBox 16"/>
+            <p:cNvSpPr txBox="1"/>
+            <p:nvPr/>
+          </p:nvSpPr>
+          <p:spPr>
+            <a:xfrm>
+              <a:off x="197556" y="3502869"/>
+              <a:ext cx="3875851" cy="276999"/>
+            </a:xfrm>
+            <a:prstGeom prst="rect">
+              <a:avLst/>
+            </a:prstGeom>
+            <a:noFill/>
+          </p:spPr>
+          <p:txBody>
+            <a:bodyPr wrap="square" rtlCol="0">
+              <a:spAutoFit/>
+            </a:bodyPr>
+            <a:lstStyle/>
+            <a:p>
+              <a:r>
+                <a:rPr lang="en-US" sz="1200" dirty="0">
+                  <a:latin typeface="Courier"/>
+                  <a:cs typeface="Courier"/>
+                </a:rPr>
+                <a:t>emit </a:t>
+              </a:r>
+              <a:r>
+                <a:rPr lang="en-US" sz="1200" dirty="0" err="1">
+                  <a:latin typeface="Courier"/>
+                  <a:cs typeface="Courier"/>
+                </a:rPr>
+                <a:t>artifactSelected</a:t>
+              </a:r>
+              <a:r>
+                <a:rPr lang="en-US" sz="1200" dirty="0">
+                  <a:latin typeface="Courier"/>
+                  <a:cs typeface="Courier"/>
+                </a:rPr>
+                <a:t>(</a:t>
+              </a:r>
+              <a:r>
+                <a:rPr lang="en-US" sz="1200" dirty="0" err="1">
+                  <a:latin typeface="Courier"/>
+                  <a:cs typeface="Courier"/>
+                </a:rPr>
+                <a:t>const</a:t>
+              </a:r>
+              <a:r>
+                <a:rPr lang="en-US" sz="1200" dirty="0">
+                  <a:latin typeface="Courier"/>
+                  <a:cs typeface="Courier"/>
+                </a:rPr>
+                <a:t> </a:t>
+              </a:r>
+              <a:r>
+                <a:rPr lang="en-US" sz="1200" dirty="0" err="1">
+                  <a:latin typeface="Courier"/>
+                  <a:cs typeface="Courier"/>
+                </a:rPr>
+                <a:t>QString</a:t>
+              </a:r>
+              <a:r>
+                <a:rPr lang="en-US" sz="1200" dirty="0">
+                  <a:latin typeface="Courier"/>
+                  <a:cs typeface="Courier"/>
+                </a:rPr>
+                <a:t> &amp;)</a:t>
+              </a:r>
+            </a:p>
+          </p:txBody>
+        </p:sp>
+        <p:sp>
+          <p:nvSpPr>
+            <p:cNvPr id="20" name="Rectangle 19"/>
+            <p:cNvSpPr/>
+            <p:nvPr/>
+          </p:nvSpPr>
+          <p:spPr>
+            <a:xfrm>
+              <a:off x="366890" y="2095030"/>
+              <a:ext cx="1665111" cy="159926"/>
+            </a:xfrm>
+            <a:prstGeom prst="rect">
+              <a:avLst/>
+            </a:prstGeom>
+          </p:spPr>
+          <p:style>
+            <a:lnRef idx="1">
+              <a:schemeClr val="accent1"/>
+            </a:lnRef>
+            <a:fillRef idx="3">
+              <a:schemeClr val="accent1"/>
+            </a:fillRef>
+            <a:effectRef idx="2">
+              <a:schemeClr val="accent1"/>
+            </a:effectRef>
+            <a:fontRef idx="minor">
+              <a:schemeClr val="lt1"/>
+            </a:fontRef>
+          </p:style>
+          <p:txBody>
+            <a:bodyPr rtlCol="0" anchor="ctr"/>
+            <a:lstStyle/>
+            <a:p>
+              <a:pPr algn="ctr"/>
+              <a:endParaRPr lang="en-US"/>
+            </a:p>
+          </p:txBody>
+        </p:sp>
+        <p:sp>
+          <p:nvSpPr>
+            <p:cNvPr id="21" name="Rectangle 20"/>
+            <p:cNvSpPr/>
+            <p:nvPr/>
+          </p:nvSpPr>
+          <p:spPr>
+            <a:xfrm>
+              <a:off x="366890" y="2329274"/>
+              <a:ext cx="1665111" cy="159926"/>
+            </a:xfrm>
+            <a:prstGeom prst="rect">
+              <a:avLst/>
+            </a:prstGeom>
+          </p:spPr>
+          <p:style>
+            <a:lnRef idx="1">
+              <a:schemeClr val="accent1"/>
+            </a:lnRef>
+            <a:fillRef idx="3">
+              <a:schemeClr val="accent1"/>
+            </a:fillRef>
+            <a:effectRef idx="2">
+              <a:schemeClr val="accent1"/>
+            </a:effectRef>
+            <a:fontRef idx="minor">
+              <a:schemeClr val="lt1"/>
+            </a:fontRef>
+          </p:style>
+          <p:txBody>
+            <a:bodyPr rtlCol="0" anchor="ctr"/>
+            <a:lstStyle/>
+            <a:p>
+              <a:pPr algn="ctr"/>
+              <a:endParaRPr lang="en-US"/>
+            </a:p>
+          </p:txBody>
+        </p:sp>
+      </p:grpSp>
     </p:spTree>
     <p:extLst>
       <p:ext uri="{BB962C8B-B14F-4D97-AF65-F5344CB8AC3E}">

</xml_diff>